<commit_message>
almost done with thesis
</commit_message>
<xml_diff>
--- a/marks_figures/PK results/PKfigure.pptx
+++ b/marks_figures/PK results/PKfigure.pptx
@@ -243,7 +243,7 @@
           <a:p>
             <a:fld id="{4F3BCB73-FF04-0F43-B333-7A03937A0699}" type="datetimeFigureOut">
               <a:rPr lang="en-US" smtClean="0"/>
-              <a:t>3/8/19</a:t>
+              <a:t>3/9/19</a:t>
             </a:fld>
             <a:endParaRPr lang="en-US"/>
           </a:p>
@@ -413,7 +413,7 @@
           <a:p>
             <a:fld id="{4F3BCB73-FF04-0F43-B333-7A03937A0699}" type="datetimeFigureOut">
               <a:rPr lang="en-US" smtClean="0"/>
-              <a:t>3/8/19</a:t>
+              <a:t>3/9/19</a:t>
             </a:fld>
             <a:endParaRPr lang="en-US"/>
           </a:p>
@@ -593,7 +593,7 @@
           <a:p>
             <a:fld id="{4F3BCB73-FF04-0F43-B333-7A03937A0699}" type="datetimeFigureOut">
               <a:rPr lang="en-US" smtClean="0"/>
-              <a:t>3/8/19</a:t>
+              <a:t>3/9/19</a:t>
             </a:fld>
             <a:endParaRPr lang="en-US"/>
           </a:p>
@@ -763,7 +763,7 @@
           <a:p>
             <a:fld id="{4F3BCB73-FF04-0F43-B333-7A03937A0699}" type="datetimeFigureOut">
               <a:rPr lang="en-US" smtClean="0"/>
-              <a:t>3/8/19</a:t>
+              <a:t>3/9/19</a:t>
             </a:fld>
             <a:endParaRPr lang="en-US"/>
           </a:p>
@@ -1007,7 +1007,7 @@
           <a:p>
             <a:fld id="{4F3BCB73-FF04-0F43-B333-7A03937A0699}" type="datetimeFigureOut">
               <a:rPr lang="en-US" smtClean="0"/>
-              <a:t>3/8/19</a:t>
+              <a:t>3/9/19</a:t>
             </a:fld>
             <a:endParaRPr lang="en-US"/>
           </a:p>
@@ -1239,7 +1239,7 @@
           <a:p>
             <a:fld id="{4F3BCB73-FF04-0F43-B333-7A03937A0699}" type="datetimeFigureOut">
               <a:rPr lang="en-US" smtClean="0"/>
-              <a:t>3/8/19</a:t>
+              <a:t>3/9/19</a:t>
             </a:fld>
             <a:endParaRPr lang="en-US"/>
           </a:p>
@@ -1606,7 +1606,7 @@
           <a:p>
             <a:fld id="{4F3BCB73-FF04-0F43-B333-7A03937A0699}" type="datetimeFigureOut">
               <a:rPr lang="en-US" smtClean="0"/>
-              <a:t>3/8/19</a:t>
+              <a:t>3/9/19</a:t>
             </a:fld>
             <a:endParaRPr lang="en-US"/>
           </a:p>
@@ -1724,7 +1724,7 @@
           <a:p>
             <a:fld id="{4F3BCB73-FF04-0F43-B333-7A03937A0699}" type="datetimeFigureOut">
               <a:rPr lang="en-US" smtClean="0"/>
-              <a:t>3/8/19</a:t>
+              <a:t>3/9/19</a:t>
             </a:fld>
             <a:endParaRPr lang="en-US"/>
           </a:p>
@@ -1819,7 +1819,7 @@
           <a:p>
             <a:fld id="{4F3BCB73-FF04-0F43-B333-7A03937A0699}" type="datetimeFigureOut">
               <a:rPr lang="en-US" smtClean="0"/>
-              <a:t>3/8/19</a:t>
+              <a:t>3/9/19</a:t>
             </a:fld>
             <a:endParaRPr lang="en-US"/>
           </a:p>
@@ -2096,7 +2096,7 @@
           <a:p>
             <a:fld id="{4F3BCB73-FF04-0F43-B333-7A03937A0699}" type="datetimeFigureOut">
               <a:rPr lang="en-US" smtClean="0"/>
-              <a:t>3/8/19</a:t>
+              <a:t>3/9/19</a:t>
             </a:fld>
             <a:endParaRPr lang="en-US"/>
           </a:p>
@@ -2353,7 +2353,7 @@
           <a:p>
             <a:fld id="{4F3BCB73-FF04-0F43-B333-7A03937A0699}" type="datetimeFigureOut">
               <a:rPr lang="en-US" smtClean="0"/>
-              <a:t>3/8/19</a:t>
+              <a:t>3/9/19</a:t>
             </a:fld>
             <a:endParaRPr lang="en-US"/>
           </a:p>
@@ -2566,7 +2566,7 @@
           <a:p>
             <a:fld id="{4F3BCB73-FF04-0F43-B333-7A03937A0699}" type="datetimeFigureOut">
               <a:rPr lang="en-US" smtClean="0"/>
-              <a:t>3/8/19</a:t>
+              <a:t>3/9/19</a:t>
             </a:fld>
             <a:endParaRPr lang="en-US"/>
           </a:p>
@@ -3053,6 +3053,7 @@
           </a:bodyPr>
           <a:lstStyle/>
           <a:p>
+            <a:pPr algn="just"/>
             <a:r>
               <a:rPr lang="en-US" sz="1100" b="1" dirty="0">
                 <a:latin typeface="Arial" charset="0"/>
@@ -3067,15 +3068,7 @@
                 <a:ea typeface="Arial" charset="0"/>
                 <a:cs typeface="Arial" charset="0"/>
               </a:rPr>
-              <a:t>c</a:t>
-            </a:r>
-            <a:r>
-              <a:rPr lang="en-US" sz="1100" dirty="0">
-                <a:latin typeface="Arial" charset="0"/>
-                <a:ea typeface="Arial" charset="0"/>
-                <a:cs typeface="Arial" charset="0"/>
-              </a:rPr>
-              <a:t>omparing the </a:t>
+              <a:t>comparing the </a:t>
             </a:r>
             <a:r>
               <a:rPr lang="en-US" sz="1100" dirty="0" err="1">
@@ -3437,11 +3430,6 @@
               </a:rPr>
               <a:t> score</a:t>
             </a:r>
-            <a:endParaRPr lang="en-US" sz="600" dirty="0">
-              <a:latin typeface="Arial" charset="0"/>
-              <a:ea typeface="Arial" charset="0"/>
-              <a:cs typeface="Arial" charset="0"/>
-            </a:endParaRPr>
           </a:p>
         </p:txBody>
       </p:sp>
@@ -3491,11 +3479,6 @@
               </a:rPr>
               <a:t> score</a:t>
             </a:r>
-            <a:endParaRPr lang="en-US" sz="600" dirty="0">
-              <a:latin typeface="Arial" charset="0"/>
-              <a:ea typeface="Arial" charset="0"/>
-              <a:cs typeface="Arial" charset="0"/>
-            </a:endParaRPr>
           </a:p>
         </p:txBody>
       </p:sp>

</xml_diff>